<commit_message>
method updates and new landing page
</commit_message>
<xml_diff>
--- a/public/uploads/slides/ppt/Backcasting.pptx
+++ b/public/uploads/slides/ppt/Backcasting.pptx
@@ -2192,7 +2192,7 @@
           </a:ln>
           <a:extLst>
             <a:ext uri="{C572A759-6A51-4108-AA02-DFA0A04FC94B}">
-              <ma14:wrappingTextBoxFlag xmlns:ma14="http://schemas.microsoft.com/office/mac/drawingml/2011/main" xmlns="" val="1"/>
+              <ma14:wrappingTextBoxFlag xmlns="" xmlns:ma14="http://schemas.microsoft.com/office/mac/drawingml/2011/main" val="1"/>
             </a:ext>
           </a:extLst>
         </p:spPr>
@@ -2231,7 +2231,7 @@
           </a:ln>
           <a:extLst>
             <a:ext uri="{C572A759-6A51-4108-AA02-DFA0A04FC94B}">
-              <ma14:wrappingTextBoxFlag xmlns:ma14="http://schemas.microsoft.com/office/mac/drawingml/2011/main" xmlns="" val="1"/>
+              <ma14:wrappingTextBoxFlag xmlns="" xmlns:ma14="http://schemas.microsoft.com/office/mac/drawingml/2011/main" val="1"/>
             </a:ext>
           </a:extLst>
         </p:spPr>
@@ -3213,7 +3213,7 @@
             </a:ln>
             <a:extLst>
               <a:ext uri="{C572A759-6A51-4108-AA02-DFA0A04FC94B}">
-                <ma14:wrappingTextBoxFlag xmlns:ma14="http://schemas.microsoft.com/office/mac/drawingml/2011/main" xmlns="" val="1"/>
+                <ma14:wrappingTextBoxFlag xmlns="" xmlns:ma14="http://schemas.microsoft.com/office/mac/drawingml/2011/main" val="1"/>
               </a:ext>
             </a:extLst>
           </p:spPr>
@@ -3312,7 +3312,7 @@
             </a:ln>
             <a:extLst>
               <a:ext uri="{C572A759-6A51-4108-AA02-DFA0A04FC94B}">
-                <ma14:wrappingTextBoxFlag xmlns:ma14="http://schemas.microsoft.com/office/mac/drawingml/2011/main" xmlns="" val="1"/>
+                <ma14:wrappingTextBoxFlag xmlns="" xmlns:ma14="http://schemas.microsoft.com/office/mac/drawingml/2011/main" val="1"/>
               </a:ext>
             </a:extLst>
           </p:spPr>
@@ -3480,7 +3480,7 @@
             </a:ln>
             <a:extLst>
               <a:ext uri="{C572A759-6A51-4108-AA02-DFA0A04FC94B}">
-                <ma14:wrappingTextBoxFlag xmlns:ma14="http://schemas.microsoft.com/office/mac/drawingml/2011/main" xmlns="" val="1"/>
+                <ma14:wrappingTextBoxFlag xmlns="" xmlns:ma14="http://schemas.microsoft.com/office/mac/drawingml/2011/main" val="1"/>
               </a:ext>
             </a:extLst>
           </p:spPr>
@@ -3571,7 +3571,7 @@
             </a:ln>
             <a:extLst>
               <a:ext uri="{C572A759-6A51-4108-AA02-DFA0A04FC94B}">
-                <ma14:wrappingTextBoxFlag xmlns:ma14="http://schemas.microsoft.com/office/mac/drawingml/2011/main" xmlns="" val="1"/>
+                <ma14:wrappingTextBoxFlag xmlns="" xmlns:ma14="http://schemas.microsoft.com/office/mac/drawingml/2011/main" val="1"/>
               </a:ext>
             </a:extLst>
           </p:spPr>
@@ -3766,7 +3766,7 @@
             </a:ln>
             <a:extLst>
               <a:ext uri="{C572A759-6A51-4108-AA02-DFA0A04FC94B}">
-                <ma14:wrappingTextBoxFlag xmlns:ma14="http://schemas.microsoft.com/office/mac/drawingml/2011/main" xmlns="" val="1"/>
+                <ma14:wrappingTextBoxFlag xmlns="" xmlns:ma14="http://schemas.microsoft.com/office/mac/drawingml/2011/main" val="1"/>
               </a:ext>
             </a:extLst>
           </p:spPr>
@@ -3861,7 +3861,7 @@
             </a:ln>
             <a:extLst>
               <a:ext uri="{C572A759-6A51-4108-AA02-DFA0A04FC94B}">
-                <ma14:wrappingTextBoxFlag xmlns:ma14="http://schemas.microsoft.com/office/mac/drawingml/2011/main" xmlns="" val="1"/>
+                <ma14:wrappingTextBoxFlag xmlns="" xmlns:ma14="http://schemas.microsoft.com/office/mac/drawingml/2011/main" val="1"/>
               </a:ext>
             </a:extLst>
           </p:spPr>
@@ -3952,7 +3952,7 @@
             </a:ln>
             <a:extLst>
               <a:ext uri="{C572A759-6A51-4108-AA02-DFA0A04FC94B}">
-                <ma14:wrappingTextBoxFlag xmlns:ma14="http://schemas.microsoft.com/office/mac/drawingml/2011/main" xmlns="" val="1"/>
+                <ma14:wrappingTextBoxFlag xmlns="" xmlns:ma14="http://schemas.microsoft.com/office/mac/drawingml/2011/main" val="1"/>
               </a:ext>
             </a:extLst>
           </p:spPr>
@@ -4131,7 +4131,7 @@
             </a:ln>
             <a:extLst>
               <a:ext uri="{C572A759-6A51-4108-AA02-DFA0A04FC94B}">
-                <ma14:wrappingTextBoxFlag xmlns:ma14="http://schemas.microsoft.com/office/mac/drawingml/2011/main" xmlns="" val="1"/>
+                <ma14:wrappingTextBoxFlag xmlns="" xmlns:ma14="http://schemas.microsoft.com/office/mac/drawingml/2011/main" val="1"/>
               </a:ext>
             </a:extLst>
           </p:spPr>
@@ -4213,7 +4213,7 @@
           </a:ln>
           <a:extLst>
             <a:ext uri="{C572A759-6A51-4108-AA02-DFA0A04FC94B}">
-              <ma14:wrappingTextBoxFlag xmlns:ma14="http://schemas.microsoft.com/office/mac/drawingml/2011/main" xmlns="" val="1"/>
+              <ma14:wrappingTextBoxFlag xmlns="" xmlns:ma14="http://schemas.microsoft.com/office/mac/drawingml/2011/main" val="1"/>
             </a:ext>
           </a:extLst>
         </p:spPr>
@@ -4258,10 +4258,10 @@
         </p:nvGrpSpPr>
         <p:grpSpPr>
           <a:xfrm>
-            <a:off x="-35678" y="-1160270"/>
-            <a:ext cx="23900312" cy="14269123"/>
-            <a:chOff x="-35678" y="-1160270"/>
-            <a:chExt cx="23900312" cy="14269123"/>
+            <a:off x="-35678" y="-708310"/>
+            <a:ext cx="23900312" cy="13817163"/>
+            <a:chOff x="-35678" y="-708310"/>
+            <a:chExt cx="23900312" cy="13817163"/>
           </a:xfrm>
         </p:grpSpPr>
         <p:sp>
@@ -4386,7 +4386,7 @@
           </p:nvSpPr>
           <p:spPr>
             <a:xfrm>
-              <a:off x="191947" y="-1160270"/>
+              <a:off x="-19067" y="-708310"/>
               <a:ext cx="13486209" cy="4039567"/>
             </a:xfrm>
             <a:prstGeom prst="rect">
@@ -4397,7 +4397,7 @@
             </a:ln>
             <a:extLst>
               <a:ext uri="{C572A759-6A51-4108-AA02-DFA0A04FC94B}">
-                <ma14:wrappingTextBoxFlag xmlns:ma14="http://schemas.microsoft.com/office/mac/drawingml/2011/main" xmlns="" val="1"/>
+                <ma14:wrappingTextBoxFlag xmlns="" xmlns:ma14="http://schemas.microsoft.com/office/mac/drawingml/2011/main" val="1"/>
               </a:ext>
             </a:extLst>
           </p:spPr>
@@ -4448,7 +4448,7 @@
             </a:ln>
             <a:extLst>
               <a:ext uri="{C572A759-6A51-4108-AA02-DFA0A04FC94B}">
-                <ma14:wrappingTextBoxFlag xmlns:ma14="http://schemas.microsoft.com/office/mac/drawingml/2011/main" xmlns="" val="1"/>
+                <ma14:wrappingTextBoxFlag xmlns="" xmlns:ma14="http://schemas.microsoft.com/office/mac/drawingml/2011/main" val="1"/>
               </a:ext>
             </a:extLst>
           </p:spPr>
@@ -4529,7 +4529,7 @@
           </a:ln>
           <a:extLst>
             <a:ext uri="{C572A759-6A51-4108-AA02-DFA0A04FC94B}">
-              <ma14:wrappingTextBoxFlag xmlns:ma14="http://schemas.microsoft.com/office/mac/drawingml/2011/main" xmlns="" val="1"/>
+              <ma14:wrappingTextBoxFlag xmlns="" xmlns:ma14="http://schemas.microsoft.com/office/mac/drawingml/2011/main" val="1"/>
             </a:ext>
           </a:extLst>
         </p:spPr>
@@ -4578,7 +4578,7 @@
           </a:ln>
           <a:extLst>
             <a:ext uri="{C572A759-6A51-4108-AA02-DFA0A04FC94B}">
-              <ma14:wrappingTextBoxFlag xmlns:ma14="http://schemas.microsoft.com/office/mac/drawingml/2011/main" xmlns="" val="1"/>
+              <ma14:wrappingTextBoxFlag xmlns="" xmlns:ma14="http://schemas.microsoft.com/office/mac/drawingml/2011/main" val="1"/>
             </a:ext>
           </a:extLst>
         </p:spPr>
@@ -4625,7 +4625,7 @@
           </a:ln>
           <a:extLst>
             <a:ext uri="{C572A759-6A51-4108-AA02-DFA0A04FC94B}">
-              <ma14:wrappingTextBoxFlag xmlns:ma14="http://schemas.microsoft.com/office/mac/drawingml/2011/main" xmlns="" val="1"/>
+              <ma14:wrappingTextBoxFlag xmlns="" xmlns:ma14="http://schemas.microsoft.com/office/mac/drawingml/2011/main" val="1"/>
             </a:ext>
           </a:extLst>
         </p:spPr>
@@ -4681,7 +4681,7 @@
           </a:ln>
           <a:extLst>
             <a:ext uri="{C572A759-6A51-4108-AA02-DFA0A04FC94B}">
-              <ma14:wrappingTextBoxFlag xmlns:ma14="http://schemas.microsoft.com/office/mac/drawingml/2011/main" xmlns="" val="1"/>
+              <ma14:wrappingTextBoxFlag xmlns="" xmlns:ma14="http://schemas.microsoft.com/office/mac/drawingml/2011/main" val="1"/>
             </a:ext>
           </a:extLst>
         </p:spPr>
@@ -4737,7 +4737,7 @@
           </a:ln>
           <a:extLst>
             <a:ext uri="{C572A759-6A51-4108-AA02-DFA0A04FC94B}">
-              <ma14:wrappingTextBoxFlag xmlns:ma14="http://schemas.microsoft.com/office/mac/drawingml/2011/main" xmlns="" val="1"/>
+              <ma14:wrappingTextBoxFlag xmlns="" xmlns:ma14="http://schemas.microsoft.com/office/mac/drawingml/2011/main" val="1"/>
             </a:ext>
           </a:extLst>
         </p:spPr>
@@ -4793,7 +4793,7 @@
           </a:ln>
           <a:extLst>
             <a:ext uri="{C572A759-6A51-4108-AA02-DFA0A04FC94B}">
-              <ma14:wrappingTextBoxFlag xmlns:ma14="http://schemas.microsoft.com/office/mac/drawingml/2011/main" xmlns="" val="1"/>
+              <ma14:wrappingTextBoxFlag xmlns="" xmlns:ma14="http://schemas.microsoft.com/office/mac/drawingml/2011/main" val="1"/>
             </a:ext>
           </a:extLst>
         </p:spPr>
@@ -4910,7 +4910,7 @@
           </a:ln>
           <a:extLst>
             <a:ext uri="{C572A759-6A51-4108-AA02-DFA0A04FC94B}">
-              <ma14:wrappingTextBoxFlag xmlns:ma14="http://schemas.microsoft.com/office/mac/drawingml/2011/main" xmlns="" val="1"/>
+              <ma14:wrappingTextBoxFlag xmlns="" xmlns:ma14="http://schemas.microsoft.com/office/mac/drawingml/2011/main" val="1"/>
             </a:ext>
           </a:extLst>
         </p:spPr>
@@ -5197,7 +5197,7 @@
             </a:ln>
             <a:extLst>
               <a:ext uri="{C572A759-6A51-4108-AA02-DFA0A04FC94B}">
-                <ma14:wrappingTextBoxFlag xmlns:ma14="http://schemas.microsoft.com/office/mac/drawingml/2011/main" xmlns="" val="1"/>
+                <ma14:wrappingTextBoxFlag xmlns="" xmlns:ma14="http://schemas.microsoft.com/office/mac/drawingml/2011/main" val="1"/>
               </a:ext>
             </a:extLst>
           </p:spPr>
@@ -5366,7 +5366,7 @@
             </a:ln>
             <a:extLst>
               <a:ext uri="{C572A759-6A51-4108-AA02-DFA0A04FC94B}">
-                <ma14:wrappingTextBoxFlag xmlns:ma14="http://schemas.microsoft.com/office/mac/drawingml/2011/main" xmlns="" val="1"/>
+                <ma14:wrappingTextBoxFlag xmlns="" xmlns:ma14="http://schemas.microsoft.com/office/mac/drawingml/2011/main" val="1"/>
               </a:ext>
             </a:extLst>
           </p:spPr>
@@ -5417,7 +5417,7 @@
             </a:ln>
             <a:extLst>
               <a:ext uri="{C572A759-6A51-4108-AA02-DFA0A04FC94B}">
-                <ma14:wrappingTextBoxFlag xmlns:ma14="http://schemas.microsoft.com/office/mac/drawingml/2011/main" xmlns="" val="1"/>
+                <ma14:wrappingTextBoxFlag xmlns="" xmlns:ma14="http://schemas.microsoft.com/office/mac/drawingml/2011/main" val="1"/>
               </a:ext>
             </a:extLst>
           </p:spPr>
@@ -5589,7 +5589,7 @@
             </a:ln>
             <a:extLst>
               <a:ext uri="{C572A759-6A51-4108-AA02-DFA0A04FC94B}">
-                <ma14:wrappingTextBoxFlag xmlns:ma14="http://schemas.microsoft.com/office/mac/drawingml/2011/main" xmlns="" val="1"/>
+                <ma14:wrappingTextBoxFlag xmlns="" xmlns:ma14="http://schemas.microsoft.com/office/mac/drawingml/2011/main" val="1"/>
               </a:ext>
             </a:extLst>
           </p:spPr>
@@ -5723,7 +5723,7 @@
             </a:ln>
             <a:extLst>
               <a:ext uri="{C572A759-6A51-4108-AA02-DFA0A04FC94B}">
-                <ma14:wrappingTextBoxFlag xmlns:ma14="http://schemas.microsoft.com/office/mac/drawingml/2011/main" xmlns="" val="1"/>
+                <ma14:wrappingTextBoxFlag xmlns="" xmlns:ma14="http://schemas.microsoft.com/office/mac/drawingml/2011/main" val="1"/>
               </a:ext>
             </a:extLst>
           </p:spPr>
@@ -5771,7 +5771,7 @@
             </a:ln>
             <a:extLst>
               <a:ext uri="{C572A759-6A51-4108-AA02-DFA0A04FC94B}">
-                <ma14:wrappingTextBoxFlag xmlns:ma14="http://schemas.microsoft.com/office/mac/drawingml/2011/main" xmlns="" val="1"/>
+                <ma14:wrappingTextBoxFlag xmlns="" xmlns:ma14="http://schemas.microsoft.com/office/mac/drawingml/2011/main" val="1"/>
               </a:ext>
             </a:extLst>
           </p:spPr>
@@ -5819,7 +5819,7 @@
             </a:ln>
             <a:extLst>
               <a:ext uri="{C572A759-6A51-4108-AA02-DFA0A04FC94B}">
-                <ma14:wrappingTextBoxFlag xmlns:ma14="http://schemas.microsoft.com/office/mac/drawingml/2011/main" xmlns="" val="1"/>
+                <ma14:wrappingTextBoxFlag xmlns="" xmlns:ma14="http://schemas.microsoft.com/office/mac/drawingml/2011/main" val="1"/>
               </a:ext>
             </a:extLst>
           </p:spPr>
@@ -5867,7 +5867,7 @@
             </a:ln>
             <a:extLst>
               <a:ext uri="{C572A759-6A51-4108-AA02-DFA0A04FC94B}">
-                <ma14:wrappingTextBoxFlag xmlns:ma14="http://schemas.microsoft.com/office/mac/drawingml/2011/main" xmlns="" val="1"/>
+                <ma14:wrappingTextBoxFlag xmlns="" xmlns:ma14="http://schemas.microsoft.com/office/mac/drawingml/2011/main" val="1"/>
               </a:ext>
             </a:extLst>
           </p:spPr>
@@ -5915,7 +5915,7 @@
             </a:ln>
             <a:extLst>
               <a:ext uri="{C572A759-6A51-4108-AA02-DFA0A04FC94B}">
-                <ma14:wrappingTextBoxFlag xmlns:ma14="http://schemas.microsoft.com/office/mac/drawingml/2011/main" xmlns="" val="1"/>
+                <ma14:wrappingTextBoxFlag xmlns="" xmlns:ma14="http://schemas.microsoft.com/office/mac/drawingml/2011/main" val="1"/>
               </a:ext>
             </a:extLst>
           </p:spPr>
@@ -5963,7 +5963,7 @@
             </a:ln>
             <a:extLst>
               <a:ext uri="{C572A759-6A51-4108-AA02-DFA0A04FC94B}">
-                <ma14:wrappingTextBoxFlag xmlns:ma14="http://schemas.microsoft.com/office/mac/drawingml/2011/main" xmlns="" val="1"/>
+                <ma14:wrappingTextBoxFlag xmlns="" xmlns:ma14="http://schemas.microsoft.com/office/mac/drawingml/2011/main" val="1"/>
               </a:ext>
             </a:extLst>
           </p:spPr>
@@ -6016,7 +6016,7 @@
           </a:ln>
           <a:extLst>
             <a:ext uri="{C572A759-6A51-4108-AA02-DFA0A04FC94B}">
-              <ma14:wrappingTextBoxFlag xmlns:ma14="http://schemas.microsoft.com/office/mac/drawingml/2011/main" xmlns="" val="1"/>
+              <ma14:wrappingTextBoxFlag xmlns="" xmlns:ma14="http://schemas.microsoft.com/office/mac/drawingml/2011/main" val="1"/>
             </a:ext>
           </a:extLst>
         </p:spPr>
@@ -6094,7 +6094,7 @@
           </a:ln>
           <a:extLst>
             <a:ext uri="{C572A759-6A51-4108-AA02-DFA0A04FC94B}">
-              <ma14:wrappingTextBoxFlag xmlns:ma14="http://schemas.microsoft.com/office/mac/drawingml/2011/main" xmlns="" val="1"/>
+              <ma14:wrappingTextBoxFlag xmlns="" xmlns:ma14="http://schemas.microsoft.com/office/mac/drawingml/2011/main" val="1"/>
             </a:ext>
           </a:extLst>
         </p:spPr>
@@ -6150,7 +6150,7 @@
           </a:ln>
           <a:extLst>
             <a:ext uri="{C572A759-6A51-4108-AA02-DFA0A04FC94B}">
-              <ma14:wrappingTextBoxFlag xmlns:ma14="http://schemas.microsoft.com/office/mac/drawingml/2011/main" xmlns="" val="1"/>
+              <ma14:wrappingTextBoxFlag xmlns="" xmlns:ma14="http://schemas.microsoft.com/office/mac/drawingml/2011/main" val="1"/>
             </a:ext>
           </a:extLst>
         </p:spPr>
@@ -6197,7 +6197,7 @@
           </a:ln>
           <a:extLst>
             <a:ext uri="{C572A759-6A51-4108-AA02-DFA0A04FC94B}">
-              <ma14:wrappingTextBoxFlag xmlns:ma14="http://schemas.microsoft.com/office/mac/drawingml/2011/main" xmlns="" val="1"/>
+              <ma14:wrappingTextBoxFlag xmlns="" xmlns:ma14="http://schemas.microsoft.com/office/mac/drawingml/2011/main" val="1"/>
             </a:ext>
           </a:extLst>
         </p:spPr>
@@ -6253,7 +6253,7 @@
           </a:ln>
           <a:extLst>
             <a:ext uri="{C572A759-6A51-4108-AA02-DFA0A04FC94B}">
-              <ma14:wrappingTextBoxFlag xmlns:ma14="http://schemas.microsoft.com/office/mac/drawingml/2011/main" xmlns="" val="1"/>
+              <ma14:wrappingTextBoxFlag xmlns="" xmlns:ma14="http://schemas.microsoft.com/office/mac/drawingml/2011/main" val="1"/>
             </a:ext>
           </a:extLst>
         </p:spPr>
@@ -6309,7 +6309,7 @@
           </a:ln>
           <a:extLst>
             <a:ext uri="{C572A759-6A51-4108-AA02-DFA0A04FC94B}">
-              <ma14:wrappingTextBoxFlag xmlns:ma14="http://schemas.microsoft.com/office/mac/drawingml/2011/main" xmlns="" val="1"/>
+              <ma14:wrappingTextBoxFlag xmlns="" xmlns:ma14="http://schemas.microsoft.com/office/mac/drawingml/2011/main" val="1"/>
             </a:ext>
           </a:extLst>
         </p:spPr>
@@ -6365,7 +6365,7 @@
           </a:ln>
           <a:extLst>
             <a:ext uri="{C572A759-6A51-4108-AA02-DFA0A04FC94B}">
-              <ma14:wrappingTextBoxFlag xmlns:ma14="http://schemas.microsoft.com/office/mac/drawingml/2011/main" xmlns="" val="1"/>
+              <ma14:wrappingTextBoxFlag xmlns="" xmlns:ma14="http://schemas.microsoft.com/office/mac/drawingml/2011/main" val="1"/>
             </a:ext>
           </a:extLst>
         </p:spPr>
@@ -6482,7 +6482,7 @@
           </a:ln>
           <a:extLst>
             <a:ext uri="{C572A759-6A51-4108-AA02-DFA0A04FC94B}">
-              <ma14:wrappingTextBoxFlag xmlns:ma14="http://schemas.microsoft.com/office/mac/drawingml/2011/main" xmlns="" val="1"/>
+              <ma14:wrappingTextBoxFlag xmlns="" xmlns:ma14="http://schemas.microsoft.com/office/mac/drawingml/2011/main" val="1"/>
             </a:ext>
           </a:extLst>
         </p:spPr>
@@ -6759,7 +6759,7 @@
             </a:ln>
             <a:extLst>
               <a:ext uri="{C572A759-6A51-4108-AA02-DFA0A04FC94B}">
-                <ma14:wrappingTextBoxFlag xmlns:ma14="http://schemas.microsoft.com/office/mac/drawingml/2011/main" xmlns="" val="1"/>
+                <ma14:wrappingTextBoxFlag xmlns="" xmlns:ma14="http://schemas.microsoft.com/office/mac/drawingml/2011/main" val="1"/>
               </a:ext>
             </a:extLst>
           </p:spPr>
@@ -6923,7 +6923,7 @@
             </a:ln>
             <a:extLst>
               <a:ext uri="{C572A759-6A51-4108-AA02-DFA0A04FC94B}">
-                <ma14:wrappingTextBoxFlag xmlns:ma14="http://schemas.microsoft.com/office/mac/drawingml/2011/main" xmlns="" val="1"/>
+                <ma14:wrappingTextBoxFlag xmlns="" xmlns:ma14="http://schemas.microsoft.com/office/mac/drawingml/2011/main" val="1"/>
               </a:ext>
             </a:extLst>
           </p:spPr>
@@ -6974,7 +6974,7 @@
             </a:ln>
             <a:extLst>
               <a:ext uri="{C572A759-6A51-4108-AA02-DFA0A04FC94B}">
-                <ma14:wrappingTextBoxFlag xmlns:ma14="http://schemas.microsoft.com/office/mac/drawingml/2011/main" xmlns="" val="1"/>
+                <ma14:wrappingTextBoxFlag xmlns="" xmlns:ma14="http://schemas.microsoft.com/office/mac/drawingml/2011/main" val="1"/>
               </a:ext>
             </a:extLst>
           </p:spPr>
@@ -7146,7 +7146,7 @@
             </a:ln>
             <a:extLst>
               <a:ext uri="{C572A759-6A51-4108-AA02-DFA0A04FC94B}">
-                <ma14:wrappingTextBoxFlag xmlns:ma14="http://schemas.microsoft.com/office/mac/drawingml/2011/main" xmlns="" val="1"/>
+                <ma14:wrappingTextBoxFlag xmlns="" xmlns:ma14="http://schemas.microsoft.com/office/mac/drawingml/2011/main" val="1"/>
               </a:ext>
             </a:extLst>
           </p:spPr>
@@ -7271,7 +7271,7 @@
             </a:ln>
             <a:extLst>
               <a:ext uri="{C572A759-6A51-4108-AA02-DFA0A04FC94B}">
-                <ma14:wrappingTextBoxFlag xmlns:ma14="http://schemas.microsoft.com/office/mac/drawingml/2011/main" xmlns="" val="1"/>
+                <ma14:wrappingTextBoxFlag xmlns="" xmlns:ma14="http://schemas.microsoft.com/office/mac/drawingml/2011/main" val="1"/>
               </a:ext>
             </a:extLst>
           </p:spPr>
@@ -7319,7 +7319,7 @@
             </a:ln>
             <a:extLst>
               <a:ext uri="{C572A759-6A51-4108-AA02-DFA0A04FC94B}">
-                <ma14:wrappingTextBoxFlag xmlns:ma14="http://schemas.microsoft.com/office/mac/drawingml/2011/main" xmlns="" val="1"/>
+                <ma14:wrappingTextBoxFlag xmlns="" xmlns:ma14="http://schemas.microsoft.com/office/mac/drawingml/2011/main" val="1"/>
               </a:ext>
             </a:extLst>
           </p:spPr>
@@ -7367,7 +7367,7 @@
             </a:ln>
             <a:extLst>
               <a:ext uri="{C572A759-6A51-4108-AA02-DFA0A04FC94B}">
-                <ma14:wrappingTextBoxFlag xmlns:ma14="http://schemas.microsoft.com/office/mac/drawingml/2011/main" xmlns="" val="1"/>
+                <ma14:wrappingTextBoxFlag xmlns="" xmlns:ma14="http://schemas.microsoft.com/office/mac/drawingml/2011/main" val="1"/>
               </a:ext>
             </a:extLst>
           </p:spPr>
@@ -7415,7 +7415,7 @@
             </a:ln>
             <a:extLst>
               <a:ext uri="{C572A759-6A51-4108-AA02-DFA0A04FC94B}">
-                <ma14:wrappingTextBoxFlag xmlns:ma14="http://schemas.microsoft.com/office/mac/drawingml/2011/main" xmlns="" val="1"/>
+                <ma14:wrappingTextBoxFlag xmlns="" xmlns:ma14="http://schemas.microsoft.com/office/mac/drawingml/2011/main" val="1"/>
               </a:ext>
             </a:extLst>
           </p:spPr>
@@ -7463,7 +7463,7 @@
             </a:ln>
             <a:extLst>
               <a:ext uri="{C572A759-6A51-4108-AA02-DFA0A04FC94B}">
-                <ma14:wrappingTextBoxFlag xmlns:ma14="http://schemas.microsoft.com/office/mac/drawingml/2011/main" xmlns="" val="1"/>
+                <ma14:wrappingTextBoxFlag xmlns="" xmlns:ma14="http://schemas.microsoft.com/office/mac/drawingml/2011/main" val="1"/>
               </a:ext>
             </a:extLst>
           </p:spPr>
@@ -7511,7 +7511,7 @@
             </a:ln>
             <a:extLst>
               <a:ext uri="{C572A759-6A51-4108-AA02-DFA0A04FC94B}">
-                <ma14:wrappingTextBoxFlag xmlns:ma14="http://schemas.microsoft.com/office/mac/drawingml/2011/main" xmlns="" val="1"/>
+                <ma14:wrappingTextBoxFlag xmlns="" xmlns:ma14="http://schemas.microsoft.com/office/mac/drawingml/2011/main" val="1"/>
               </a:ext>
             </a:extLst>
           </p:spPr>
@@ -7563,7 +7563,7 @@
           </a:ln>
           <a:extLst>
             <a:ext uri="{C572A759-6A51-4108-AA02-DFA0A04FC94B}">
-              <ma14:wrappingTextBoxFlag xmlns:ma14="http://schemas.microsoft.com/office/mac/drawingml/2011/main" xmlns="" val="1"/>
+              <ma14:wrappingTextBoxFlag xmlns="" xmlns:ma14="http://schemas.microsoft.com/office/mac/drawingml/2011/main" val="1"/>
             </a:ext>
           </a:extLst>
         </p:spPr>
@@ -7641,7 +7641,7 @@
           </a:ln>
           <a:extLst>
             <a:ext uri="{C572A759-6A51-4108-AA02-DFA0A04FC94B}">
-              <ma14:wrappingTextBoxFlag xmlns:ma14="http://schemas.microsoft.com/office/mac/drawingml/2011/main" xmlns="" val="1"/>
+              <ma14:wrappingTextBoxFlag xmlns="" xmlns:ma14="http://schemas.microsoft.com/office/mac/drawingml/2011/main" val="1"/>
             </a:ext>
           </a:extLst>
         </p:spPr>
@@ -7697,7 +7697,7 @@
           </a:ln>
           <a:extLst>
             <a:ext uri="{C572A759-6A51-4108-AA02-DFA0A04FC94B}">
-              <ma14:wrappingTextBoxFlag xmlns:ma14="http://schemas.microsoft.com/office/mac/drawingml/2011/main" xmlns="" val="1"/>
+              <ma14:wrappingTextBoxFlag xmlns="" xmlns:ma14="http://schemas.microsoft.com/office/mac/drawingml/2011/main" val="1"/>
             </a:ext>
           </a:extLst>
         </p:spPr>
@@ -7744,7 +7744,7 @@
           </a:ln>
           <a:extLst>
             <a:ext uri="{C572A759-6A51-4108-AA02-DFA0A04FC94B}">
-              <ma14:wrappingTextBoxFlag xmlns:ma14="http://schemas.microsoft.com/office/mac/drawingml/2011/main" xmlns="" val="1"/>
+              <ma14:wrappingTextBoxFlag xmlns="" xmlns:ma14="http://schemas.microsoft.com/office/mac/drawingml/2011/main" val="1"/>
             </a:ext>
           </a:extLst>
         </p:spPr>
@@ -7800,7 +7800,7 @@
           </a:ln>
           <a:extLst>
             <a:ext uri="{C572A759-6A51-4108-AA02-DFA0A04FC94B}">
-              <ma14:wrappingTextBoxFlag xmlns:ma14="http://schemas.microsoft.com/office/mac/drawingml/2011/main" xmlns="" val="1"/>
+              <ma14:wrappingTextBoxFlag xmlns="" xmlns:ma14="http://schemas.microsoft.com/office/mac/drawingml/2011/main" val="1"/>
             </a:ext>
           </a:extLst>
         </p:spPr>
@@ -7852,7 +7852,7 @@
           </a:ln>
           <a:extLst>
             <a:ext uri="{C572A759-6A51-4108-AA02-DFA0A04FC94B}">
-              <ma14:wrappingTextBoxFlag xmlns:ma14="http://schemas.microsoft.com/office/mac/drawingml/2011/main" xmlns="" val="1"/>
+              <ma14:wrappingTextBoxFlag xmlns="" xmlns:ma14="http://schemas.microsoft.com/office/mac/drawingml/2011/main" val="1"/>
             </a:ext>
           </a:extLst>
         </p:spPr>
@@ -7911,7 +7911,7 @@
           </a:ln>
           <a:extLst>
             <a:ext uri="{C572A759-6A51-4108-AA02-DFA0A04FC94B}">
-              <ma14:wrappingTextBoxFlag xmlns:ma14="http://schemas.microsoft.com/office/mac/drawingml/2011/main" xmlns="" val="1"/>
+              <ma14:wrappingTextBoxFlag xmlns="" xmlns:ma14="http://schemas.microsoft.com/office/mac/drawingml/2011/main" val="1"/>
             </a:ext>
           </a:extLst>
         </p:spPr>
@@ -8027,7 +8027,7 @@
           </a:ln>
           <a:extLst>
             <a:ext uri="{C572A759-6A51-4108-AA02-DFA0A04FC94B}">
-              <ma14:wrappingTextBoxFlag xmlns:ma14="http://schemas.microsoft.com/office/mac/drawingml/2011/main" xmlns="" val="1"/>
+              <ma14:wrappingTextBoxFlag xmlns="" xmlns:ma14="http://schemas.microsoft.com/office/mac/drawingml/2011/main" val="1"/>
             </a:ext>
           </a:extLst>
         </p:spPr>
@@ -8304,7 +8304,7 @@
             </a:ln>
             <a:extLst>
               <a:ext uri="{C572A759-6A51-4108-AA02-DFA0A04FC94B}">
-                <ma14:wrappingTextBoxFlag xmlns:ma14="http://schemas.microsoft.com/office/mac/drawingml/2011/main" xmlns="" val="1"/>
+                <ma14:wrappingTextBoxFlag xmlns="" xmlns:ma14="http://schemas.microsoft.com/office/mac/drawingml/2011/main" val="1"/>
               </a:ext>
             </a:extLst>
           </p:spPr>
@@ -8473,7 +8473,7 @@
             </a:ln>
             <a:extLst>
               <a:ext uri="{C572A759-6A51-4108-AA02-DFA0A04FC94B}">
-                <ma14:wrappingTextBoxFlag xmlns:ma14="http://schemas.microsoft.com/office/mac/drawingml/2011/main" xmlns="" val="1"/>
+                <ma14:wrappingTextBoxFlag xmlns="" xmlns:ma14="http://schemas.microsoft.com/office/mac/drawingml/2011/main" val="1"/>
               </a:ext>
             </a:extLst>
           </p:spPr>
@@ -8524,7 +8524,7 @@
             </a:ln>
             <a:extLst>
               <a:ext uri="{C572A759-6A51-4108-AA02-DFA0A04FC94B}">
-                <ma14:wrappingTextBoxFlag xmlns:ma14="http://schemas.microsoft.com/office/mac/drawingml/2011/main" xmlns="" val="1"/>
+                <ma14:wrappingTextBoxFlag xmlns="" xmlns:ma14="http://schemas.microsoft.com/office/mac/drawingml/2011/main" val="1"/>
               </a:ext>
             </a:extLst>
           </p:spPr>
@@ -8696,7 +8696,7 @@
             </a:ln>
             <a:extLst>
               <a:ext uri="{C572A759-6A51-4108-AA02-DFA0A04FC94B}">
-                <ma14:wrappingTextBoxFlag xmlns:ma14="http://schemas.microsoft.com/office/mac/drawingml/2011/main" xmlns="" val="1"/>
+                <ma14:wrappingTextBoxFlag xmlns="" xmlns:ma14="http://schemas.microsoft.com/office/mac/drawingml/2011/main" val="1"/>
               </a:ext>
             </a:extLst>
           </p:spPr>
@@ -8821,7 +8821,7 @@
             </a:ln>
             <a:extLst>
               <a:ext uri="{C572A759-6A51-4108-AA02-DFA0A04FC94B}">
-                <ma14:wrappingTextBoxFlag xmlns:ma14="http://schemas.microsoft.com/office/mac/drawingml/2011/main" xmlns="" val="1"/>
+                <ma14:wrappingTextBoxFlag xmlns="" xmlns:ma14="http://schemas.microsoft.com/office/mac/drawingml/2011/main" val="1"/>
               </a:ext>
             </a:extLst>
           </p:spPr>
@@ -8869,7 +8869,7 @@
             </a:ln>
             <a:extLst>
               <a:ext uri="{C572A759-6A51-4108-AA02-DFA0A04FC94B}">
-                <ma14:wrappingTextBoxFlag xmlns:ma14="http://schemas.microsoft.com/office/mac/drawingml/2011/main" xmlns="" val="1"/>
+                <ma14:wrappingTextBoxFlag xmlns="" xmlns:ma14="http://schemas.microsoft.com/office/mac/drawingml/2011/main" val="1"/>
               </a:ext>
             </a:extLst>
           </p:spPr>
@@ -8917,7 +8917,7 @@
             </a:ln>
             <a:extLst>
               <a:ext uri="{C572A759-6A51-4108-AA02-DFA0A04FC94B}">
-                <ma14:wrappingTextBoxFlag xmlns:ma14="http://schemas.microsoft.com/office/mac/drawingml/2011/main" xmlns="" val="1"/>
+                <ma14:wrappingTextBoxFlag xmlns="" xmlns:ma14="http://schemas.microsoft.com/office/mac/drawingml/2011/main" val="1"/>
               </a:ext>
             </a:extLst>
           </p:spPr>
@@ -8965,7 +8965,7 @@
             </a:ln>
             <a:extLst>
               <a:ext uri="{C572A759-6A51-4108-AA02-DFA0A04FC94B}">
-                <ma14:wrappingTextBoxFlag xmlns:ma14="http://schemas.microsoft.com/office/mac/drawingml/2011/main" xmlns="" val="1"/>
+                <ma14:wrappingTextBoxFlag xmlns="" xmlns:ma14="http://schemas.microsoft.com/office/mac/drawingml/2011/main" val="1"/>
               </a:ext>
             </a:extLst>
           </p:spPr>
@@ -9013,7 +9013,7 @@
             </a:ln>
             <a:extLst>
               <a:ext uri="{C572A759-6A51-4108-AA02-DFA0A04FC94B}">
-                <ma14:wrappingTextBoxFlag xmlns:ma14="http://schemas.microsoft.com/office/mac/drawingml/2011/main" xmlns="" val="1"/>
+                <ma14:wrappingTextBoxFlag xmlns="" xmlns:ma14="http://schemas.microsoft.com/office/mac/drawingml/2011/main" val="1"/>
               </a:ext>
             </a:extLst>
           </p:spPr>
@@ -9061,7 +9061,7 @@
             </a:ln>
             <a:extLst>
               <a:ext uri="{C572A759-6A51-4108-AA02-DFA0A04FC94B}">
-                <ma14:wrappingTextBoxFlag xmlns:ma14="http://schemas.microsoft.com/office/mac/drawingml/2011/main" xmlns="" val="1"/>
+                <ma14:wrappingTextBoxFlag xmlns="" xmlns:ma14="http://schemas.microsoft.com/office/mac/drawingml/2011/main" val="1"/>
               </a:ext>
             </a:extLst>
           </p:spPr>
@@ -9139,7 +9139,7 @@
           </a:ln>
           <a:extLst>
             <a:ext uri="{C572A759-6A51-4108-AA02-DFA0A04FC94B}">
-              <ma14:wrappingTextBoxFlag xmlns:ma14="http://schemas.microsoft.com/office/mac/drawingml/2011/main" xmlns="" val="1"/>
+              <ma14:wrappingTextBoxFlag xmlns="" xmlns:ma14="http://schemas.microsoft.com/office/mac/drawingml/2011/main" val="1"/>
             </a:ext>
           </a:extLst>
         </p:spPr>
@@ -9194,7 +9194,7 @@
           </a:ln>
           <a:extLst>
             <a:ext uri="{C572A759-6A51-4108-AA02-DFA0A04FC94B}">
-              <ma14:wrappingTextBoxFlag xmlns:ma14="http://schemas.microsoft.com/office/mac/drawingml/2011/main" xmlns="" val="1"/>
+              <ma14:wrappingTextBoxFlag xmlns="" xmlns:ma14="http://schemas.microsoft.com/office/mac/drawingml/2011/main" val="1"/>
             </a:ext>
           </a:extLst>
         </p:spPr>
@@ -9247,7 +9247,7 @@
           </a:ln>
           <a:extLst>
             <a:ext uri="{C572A759-6A51-4108-AA02-DFA0A04FC94B}">
-              <ma14:wrappingTextBoxFlag xmlns:ma14="http://schemas.microsoft.com/office/mac/drawingml/2011/main" xmlns="" val="1"/>
+              <ma14:wrappingTextBoxFlag xmlns="" xmlns:ma14="http://schemas.microsoft.com/office/mac/drawingml/2011/main" val="1"/>
             </a:ext>
           </a:extLst>
         </p:spPr>
@@ -9309,7 +9309,7 @@
           </a:ln>
           <a:extLst>
             <a:ext uri="{C572A759-6A51-4108-AA02-DFA0A04FC94B}">
-              <ma14:wrappingTextBoxFlag xmlns:ma14="http://schemas.microsoft.com/office/mac/drawingml/2011/main" xmlns="" val="1"/>
+              <ma14:wrappingTextBoxFlag xmlns="" xmlns:ma14="http://schemas.microsoft.com/office/mac/drawingml/2011/main" val="1"/>
             </a:ext>
           </a:extLst>
         </p:spPr>
@@ -9371,7 +9371,7 @@
           </a:ln>
           <a:extLst>
             <a:ext uri="{C572A759-6A51-4108-AA02-DFA0A04FC94B}">
-              <ma14:wrappingTextBoxFlag xmlns:ma14="http://schemas.microsoft.com/office/mac/drawingml/2011/main" xmlns="" val="1"/>
+              <ma14:wrappingTextBoxFlag xmlns="" xmlns:ma14="http://schemas.microsoft.com/office/mac/drawingml/2011/main" val="1"/>
             </a:ext>
           </a:extLst>
         </p:spPr>
@@ -9433,7 +9433,7 @@
           </a:ln>
           <a:extLst>
             <a:ext uri="{C572A759-6A51-4108-AA02-DFA0A04FC94B}">
-              <ma14:wrappingTextBoxFlag xmlns:ma14="http://schemas.microsoft.com/office/mac/drawingml/2011/main" xmlns="" val="1"/>
+              <ma14:wrappingTextBoxFlag xmlns="" xmlns:ma14="http://schemas.microsoft.com/office/mac/drawingml/2011/main" val="1"/>
             </a:ext>
           </a:extLst>
         </p:spPr>
@@ -9550,7 +9550,7 @@
           </a:ln>
           <a:extLst>
             <a:ext uri="{C572A759-6A51-4108-AA02-DFA0A04FC94B}">
-              <ma14:wrappingTextBoxFlag xmlns:ma14="http://schemas.microsoft.com/office/mac/drawingml/2011/main" xmlns="" val="1"/>
+              <ma14:wrappingTextBoxFlag xmlns="" xmlns:ma14="http://schemas.microsoft.com/office/mac/drawingml/2011/main" val="1"/>
             </a:ext>
           </a:extLst>
         </p:spPr>
@@ -9827,7 +9827,7 @@
             </a:ln>
             <a:extLst>
               <a:ext uri="{C572A759-6A51-4108-AA02-DFA0A04FC94B}">
-                <ma14:wrappingTextBoxFlag xmlns:ma14="http://schemas.microsoft.com/office/mac/drawingml/2011/main" xmlns="" val="1"/>
+                <ma14:wrappingTextBoxFlag xmlns="" xmlns:ma14="http://schemas.microsoft.com/office/mac/drawingml/2011/main" val="1"/>
               </a:ext>
             </a:extLst>
           </p:spPr>
@@ -9996,7 +9996,7 @@
             </a:ln>
             <a:extLst>
               <a:ext uri="{C572A759-6A51-4108-AA02-DFA0A04FC94B}">
-                <ma14:wrappingTextBoxFlag xmlns:ma14="http://schemas.microsoft.com/office/mac/drawingml/2011/main" xmlns="" val="1"/>
+                <ma14:wrappingTextBoxFlag xmlns="" xmlns:ma14="http://schemas.microsoft.com/office/mac/drawingml/2011/main" val="1"/>
               </a:ext>
             </a:extLst>
           </p:spPr>
@@ -10047,7 +10047,7 @@
             </a:ln>
             <a:extLst>
               <a:ext uri="{C572A759-6A51-4108-AA02-DFA0A04FC94B}">
-                <ma14:wrappingTextBoxFlag xmlns:ma14="http://schemas.microsoft.com/office/mac/drawingml/2011/main" xmlns="" val="1"/>
+                <ma14:wrappingTextBoxFlag xmlns="" xmlns:ma14="http://schemas.microsoft.com/office/mac/drawingml/2011/main" val="1"/>
               </a:ext>
             </a:extLst>
           </p:spPr>
@@ -10219,7 +10219,7 @@
             </a:ln>
             <a:extLst>
               <a:ext uri="{C572A759-6A51-4108-AA02-DFA0A04FC94B}">
-                <ma14:wrappingTextBoxFlag xmlns:ma14="http://schemas.microsoft.com/office/mac/drawingml/2011/main" xmlns="" val="1"/>
+                <ma14:wrappingTextBoxFlag xmlns="" xmlns:ma14="http://schemas.microsoft.com/office/mac/drawingml/2011/main" val="1"/>
               </a:ext>
             </a:extLst>
           </p:spPr>
@@ -10344,7 +10344,7 @@
             </a:ln>
             <a:extLst>
               <a:ext uri="{C572A759-6A51-4108-AA02-DFA0A04FC94B}">
-                <ma14:wrappingTextBoxFlag xmlns:ma14="http://schemas.microsoft.com/office/mac/drawingml/2011/main" xmlns="" val="1"/>
+                <ma14:wrappingTextBoxFlag xmlns="" xmlns:ma14="http://schemas.microsoft.com/office/mac/drawingml/2011/main" val="1"/>
               </a:ext>
             </a:extLst>
           </p:spPr>
@@ -10392,7 +10392,7 @@
             </a:ln>
             <a:extLst>
               <a:ext uri="{C572A759-6A51-4108-AA02-DFA0A04FC94B}">
-                <ma14:wrappingTextBoxFlag xmlns:ma14="http://schemas.microsoft.com/office/mac/drawingml/2011/main" xmlns="" val="1"/>
+                <ma14:wrappingTextBoxFlag xmlns="" xmlns:ma14="http://schemas.microsoft.com/office/mac/drawingml/2011/main" val="1"/>
               </a:ext>
             </a:extLst>
           </p:spPr>
@@ -10440,7 +10440,7 @@
             </a:ln>
             <a:extLst>
               <a:ext uri="{C572A759-6A51-4108-AA02-DFA0A04FC94B}">
-                <ma14:wrappingTextBoxFlag xmlns:ma14="http://schemas.microsoft.com/office/mac/drawingml/2011/main" xmlns="" val="1"/>
+                <ma14:wrappingTextBoxFlag xmlns="" xmlns:ma14="http://schemas.microsoft.com/office/mac/drawingml/2011/main" val="1"/>
               </a:ext>
             </a:extLst>
           </p:spPr>
@@ -10488,7 +10488,7 @@
             </a:ln>
             <a:extLst>
               <a:ext uri="{C572A759-6A51-4108-AA02-DFA0A04FC94B}">
-                <ma14:wrappingTextBoxFlag xmlns:ma14="http://schemas.microsoft.com/office/mac/drawingml/2011/main" xmlns="" val="1"/>
+                <ma14:wrappingTextBoxFlag xmlns="" xmlns:ma14="http://schemas.microsoft.com/office/mac/drawingml/2011/main" val="1"/>
               </a:ext>
             </a:extLst>
           </p:spPr>
@@ -10536,7 +10536,7 @@
             </a:ln>
             <a:extLst>
               <a:ext uri="{C572A759-6A51-4108-AA02-DFA0A04FC94B}">
-                <ma14:wrappingTextBoxFlag xmlns:ma14="http://schemas.microsoft.com/office/mac/drawingml/2011/main" xmlns="" val="1"/>
+                <ma14:wrappingTextBoxFlag xmlns="" xmlns:ma14="http://schemas.microsoft.com/office/mac/drawingml/2011/main" val="1"/>
               </a:ext>
             </a:extLst>
           </p:spPr>
@@ -10584,7 +10584,7 @@
             </a:ln>
             <a:extLst>
               <a:ext uri="{C572A759-6A51-4108-AA02-DFA0A04FC94B}">
-                <ma14:wrappingTextBoxFlag xmlns:ma14="http://schemas.microsoft.com/office/mac/drawingml/2011/main" xmlns="" val="1"/>
+                <ma14:wrappingTextBoxFlag xmlns="" xmlns:ma14="http://schemas.microsoft.com/office/mac/drawingml/2011/main" val="1"/>
               </a:ext>
             </a:extLst>
           </p:spPr>
@@ -10636,7 +10636,7 @@
           </a:ln>
           <a:extLst>
             <a:ext uri="{C572A759-6A51-4108-AA02-DFA0A04FC94B}">
-              <ma14:wrappingTextBoxFlag xmlns:ma14="http://schemas.microsoft.com/office/mac/drawingml/2011/main" xmlns="" val="1"/>
+              <ma14:wrappingTextBoxFlag xmlns="" xmlns:ma14="http://schemas.microsoft.com/office/mac/drawingml/2011/main" val="1"/>
             </a:ext>
           </a:extLst>
         </p:spPr>
@@ -10744,7 +10744,7 @@
           </a:ln>
           <a:extLst>
             <a:ext uri="{C572A759-6A51-4108-AA02-DFA0A04FC94B}">
-              <ma14:wrappingTextBoxFlag xmlns:ma14="http://schemas.microsoft.com/office/mac/drawingml/2011/main" xmlns="" val="1"/>
+              <ma14:wrappingTextBoxFlag xmlns="" xmlns:ma14="http://schemas.microsoft.com/office/mac/drawingml/2011/main" val="1"/>
             </a:ext>
           </a:extLst>
         </p:spPr>
@@ -11002,7 +11002,7 @@
             </a:ln>
             <a:extLst>
               <a:ext uri="{C572A759-6A51-4108-AA02-DFA0A04FC94B}">
-                <ma14:wrappingTextBoxFlag xmlns:ma14="http://schemas.microsoft.com/office/mac/drawingml/2011/main" xmlns="" val="1"/>
+                <ma14:wrappingTextBoxFlag xmlns="" xmlns:ma14="http://schemas.microsoft.com/office/mac/drawingml/2011/main" val="1"/>
               </a:ext>
             </a:extLst>
           </p:spPr>
@@ -11166,7 +11166,7 @@
             </a:ln>
             <a:extLst>
               <a:ext uri="{C572A759-6A51-4108-AA02-DFA0A04FC94B}">
-                <ma14:wrappingTextBoxFlag xmlns:ma14="http://schemas.microsoft.com/office/mac/drawingml/2011/main" xmlns="" val="1"/>
+                <ma14:wrappingTextBoxFlag xmlns="" xmlns:ma14="http://schemas.microsoft.com/office/mac/drawingml/2011/main" val="1"/>
               </a:ext>
             </a:extLst>
           </p:spPr>
@@ -11217,7 +11217,7 @@
             </a:ln>
             <a:extLst>
               <a:ext uri="{C572A759-6A51-4108-AA02-DFA0A04FC94B}">
-                <ma14:wrappingTextBoxFlag xmlns:ma14="http://schemas.microsoft.com/office/mac/drawingml/2011/main" xmlns="" val="1"/>
+                <ma14:wrappingTextBoxFlag xmlns="" xmlns:ma14="http://schemas.microsoft.com/office/mac/drawingml/2011/main" val="1"/>
               </a:ext>
             </a:extLst>
           </p:spPr>
@@ -11389,7 +11389,7 @@
             </a:ln>
             <a:extLst>
               <a:ext uri="{C572A759-6A51-4108-AA02-DFA0A04FC94B}">
-                <ma14:wrappingTextBoxFlag xmlns:ma14="http://schemas.microsoft.com/office/mac/drawingml/2011/main" xmlns="" val="1"/>
+                <ma14:wrappingTextBoxFlag xmlns="" xmlns:ma14="http://schemas.microsoft.com/office/mac/drawingml/2011/main" val="1"/>
               </a:ext>
             </a:extLst>
           </p:spPr>
@@ -11514,7 +11514,7 @@
             </a:ln>
             <a:extLst>
               <a:ext uri="{C572A759-6A51-4108-AA02-DFA0A04FC94B}">
-                <ma14:wrappingTextBoxFlag xmlns:ma14="http://schemas.microsoft.com/office/mac/drawingml/2011/main" xmlns="" val="1"/>
+                <ma14:wrappingTextBoxFlag xmlns="" xmlns:ma14="http://schemas.microsoft.com/office/mac/drawingml/2011/main" val="1"/>
               </a:ext>
             </a:extLst>
           </p:spPr>
@@ -11562,7 +11562,7 @@
             </a:ln>
             <a:extLst>
               <a:ext uri="{C572A759-6A51-4108-AA02-DFA0A04FC94B}">
-                <ma14:wrappingTextBoxFlag xmlns:ma14="http://schemas.microsoft.com/office/mac/drawingml/2011/main" xmlns="" val="1"/>
+                <ma14:wrappingTextBoxFlag xmlns="" xmlns:ma14="http://schemas.microsoft.com/office/mac/drawingml/2011/main" val="1"/>
               </a:ext>
             </a:extLst>
           </p:spPr>
@@ -11610,7 +11610,7 @@
             </a:ln>
             <a:extLst>
               <a:ext uri="{C572A759-6A51-4108-AA02-DFA0A04FC94B}">
-                <ma14:wrappingTextBoxFlag xmlns:ma14="http://schemas.microsoft.com/office/mac/drawingml/2011/main" xmlns="" val="1"/>
+                <ma14:wrappingTextBoxFlag xmlns="" xmlns:ma14="http://schemas.microsoft.com/office/mac/drawingml/2011/main" val="1"/>
               </a:ext>
             </a:extLst>
           </p:spPr>
@@ -11658,7 +11658,7 @@
             </a:ln>
             <a:extLst>
               <a:ext uri="{C572A759-6A51-4108-AA02-DFA0A04FC94B}">
-                <ma14:wrappingTextBoxFlag xmlns:ma14="http://schemas.microsoft.com/office/mac/drawingml/2011/main" xmlns="" val="1"/>
+                <ma14:wrappingTextBoxFlag xmlns="" xmlns:ma14="http://schemas.microsoft.com/office/mac/drawingml/2011/main" val="1"/>
               </a:ext>
             </a:extLst>
           </p:spPr>
@@ -11706,7 +11706,7 @@
             </a:ln>
             <a:extLst>
               <a:ext uri="{C572A759-6A51-4108-AA02-DFA0A04FC94B}">
-                <ma14:wrappingTextBoxFlag xmlns:ma14="http://schemas.microsoft.com/office/mac/drawingml/2011/main" xmlns="" val="1"/>
+                <ma14:wrappingTextBoxFlag xmlns="" xmlns:ma14="http://schemas.microsoft.com/office/mac/drawingml/2011/main" val="1"/>
               </a:ext>
             </a:extLst>
           </p:spPr>
@@ -11754,7 +11754,7 @@
             </a:ln>
             <a:extLst>
               <a:ext uri="{C572A759-6A51-4108-AA02-DFA0A04FC94B}">
-                <ma14:wrappingTextBoxFlag xmlns:ma14="http://schemas.microsoft.com/office/mac/drawingml/2011/main" xmlns="" val="1"/>
+                <ma14:wrappingTextBoxFlag xmlns="" xmlns:ma14="http://schemas.microsoft.com/office/mac/drawingml/2011/main" val="1"/>
               </a:ext>
             </a:extLst>
           </p:spPr>
@@ -11800,7 +11800,7 @@
           </a:ln>
           <a:extLst>
             <a:ext uri="{C572A759-6A51-4108-AA02-DFA0A04FC94B}">
-              <ma14:wrappingTextBoxFlag xmlns:ma14="http://schemas.microsoft.com/office/mac/drawingml/2011/main" xmlns="" val="1"/>
+              <ma14:wrappingTextBoxFlag xmlns="" xmlns:ma14="http://schemas.microsoft.com/office/mac/drawingml/2011/main" val="1"/>
             </a:ext>
           </a:extLst>
         </p:spPr>
@@ -11847,7 +11847,7 @@
           </a:ln>
           <a:extLst>
             <a:ext uri="{C572A759-6A51-4108-AA02-DFA0A04FC94B}">
-              <ma14:wrappingTextBoxFlag xmlns:ma14="http://schemas.microsoft.com/office/mac/drawingml/2011/main" xmlns="" val="1"/>
+              <ma14:wrappingTextBoxFlag xmlns="" xmlns:ma14="http://schemas.microsoft.com/office/mac/drawingml/2011/main" val="1"/>
             </a:ext>
           </a:extLst>
         </p:spPr>
@@ -11903,7 +11903,7 @@
           </a:ln>
           <a:extLst>
             <a:ext uri="{C572A759-6A51-4108-AA02-DFA0A04FC94B}">
-              <ma14:wrappingTextBoxFlag xmlns:ma14="http://schemas.microsoft.com/office/mac/drawingml/2011/main" xmlns="" val="1"/>
+              <ma14:wrappingTextBoxFlag xmlns="" xmlns:ma14="http://schemas.microsoft.com/office/mac/drawingml/2011/main" val="1"/>
             </a:ext>
           </a:extLst>
         </p:spPr>
@@ -11959,7 +11959,7 @@
           </a:ln>
           <a:extLst>
             <a:ext uri="{C572A759-6A51-4108-AA02-DFA0A04FC94B}">
-              <ma14:wrappingTextBoxFlag xmlns:ma14="http://schemas.microsoft.com/office/mac/drawingml/2011/main" xmlns="" val="1"/>
+              <ma14:wrappingTextBoxFlag xmlns="" xmlns:ma14="http://schemas.microsoft.com/office/mac/drawingml/2011/main" val="1"/>
             </a:ext>
           </a:extLst>
         </p:spPr>
@@ -12015,7 +12015,7 @@
           </a:ln>
           <a:extLst>
             <a:ext uri="{C572A759-6A51-4108-AA02-DFA0A04FC94B}">
-              <ma14:wrappingTextBoxFlag xmlns:ma14="http://schemas.microsoft.com/office/mac/drawingml/2011/main" xmlns="" val="1"/>
+              <ma14:wrappingTextBoxFlag xmlns="" xmlns:ma14="http://schemas.microsoft.com/office/mac/drawingml/2011/main" val="1"/>
             </a:ext>
           </a:extLst>
         </p:spPr>
@@ -12131,7 +12131,7 @@
           </a:ln>
           <a:extLst>
             <a:ext uri="{C572A759-6A51-4108-AA02-DFA0A04FC94B}">
-              <ma14:wrappingTextBoxFlag xmlns:ma14="http://schemas.microsoft.com/office/mac/drawingml/2011/main" xmlns="" val="1"/>
+              <ma14:wrappingTextBoxFlag xmlns="" xmlns:ma14="http://schemas.microsoft.com/office/mac/drawingml/2011/main" val="1"/>
             </a:ext>
           </a:extLst>
         </p:spPr>
@@ -12182,7 +12182,7 @@
           </a:ln>
           <a:extLst>
             <a:ext uri="{C572A759-6A51-4108-AA02-DFA0A04FC94B}">
-              <ma14:wrappingTextBoxFlag xmlns:ma14="http://schemas.microsoft.com/office/mac/drawingml/2011/main" xmlns="" val="1"/>
+              <ma14:wrappingTextBoxFlag xmlns="" xmlns:ma14="http://schemas.microsoft.com/office/mac/drawingml/2011/main" val="1"/>
             </a:ext>
           </a:extLst>
         </p:spPr>
@@ -12266,7 +12266,7 @@
           </a:ln>
           <a:extLst>
             <a:ext uri="{C572A759-6A51-4108-AA02-DFA0A04FC94B}">
-              <ma14:wrappingTextBoxFlag xmlns:ma14="http://schemas.microsoft.com/office/mac/drawingml/2011/main" xmlns="" val="1"/>
+              <ma14:wrappingTextBoxFlag xmlns="" xmlns:ma14="http://schemas.microsoft.com/office/mac/drawingml/2011/main" val="1"/>
             </a:ext>
           </a:extLst>
         </p:spPr>
@@ -12321,7 +12321,7 @@
           </a:ln>
           <a:extLst>
             <a:ext uri="{C572A759-6A51-4108-AA02-DFA0A04FC94B}">
-              <ma14:wrappingTextBoxFlag xmlns:ma14="http://schemas.microsoft.com/office/mac/drawingml/2011/main" xmlns="" val="1"/>
+              <ma14:wrappingTextBoxFlag xmlns="" xmlns:ma14="http://schemas.microsoft.com/office/mac/drawingml/2011/main" val="1"/>
             </a:ext>
           </a:extLst>
         </p:spPr>
@@ -12374,7 +12374,7 @@
           </a:ln>
           <a:extLst>
             <a:ext uri="{C572A759-6A51-4108-AA02-DFA0A04FC94B}">
-              <ma14:wrappingTextBoxFlag xmlns:ma14="http://schemas.microsoft.com/office/mac/drawingml/2011/main" xmlns="" val="1"/>
+              <ma14:wrappingTextBoxFlag xmlns="" xmlns:ma14="http://schemas.microsoft.com/office/mac/drawingml/2011/main" val="1"/>
             </a:ext>
           </a:extLst>
         </p:spPr>
@@ -12436,7 +12436,7 @@
           </a:ln>
           <a:extLst>
             <a:ext uri="{C572A759-6A51-4108-AA02-DFA0A04FC94B}">
-              <ma14:wrappingTextBoxFlag xmlns:ma14="http://schemas.microsoft.com/office/mac/drawingml/2011/main" xmlns="" val="1"/>
+              <ma14:wrappingTextBoxFlag xmlns="" xmlns:ma14="http://schemas.microsoft.com/office/mac/drawingml/2011/main" val="1"/>
             </a:ext>
           </a:extLst>
         </p:spPr>
@@ -12498,7 +12498,7 @@
           </a:ln>
           <a:extLst>
             <a:ext uri="{C572A759-6A51-4108-AA02-DFA0A04FC94B}">
-              <ma14:wrappingTextBoxFlag xmlns:ma14="http://schemas.microsoft.com/office/mac/drawingml/2011/main" xmlns="" val="1"/>
+              <ma14:wrappingTextBoxFlag xmlns="" xmlns:ma14="http://schemas.microsoft.com/office/mac/drawingml/2011/main" val="1"/>
             </a:ext>
           </a:extLst>
         </p:spPr>
@@ -12560,7 +12560,7 @@
           </a:ln>
           <a:extLst>
             <a:ext uri="{C572A759-6A51-4108-AA02-DFA0A04FC94B}">
-              <ma14:wrappingTextBoxFlag xmlns:ma14="http://schemas.microsoft.com/office/mac/drawingml/2011/main" xmlns="" val="1"/>
+              <ma14:wrappingTextBoxFlag xmlns="" xmlns:ma14="http://schemas.microsoft.com/office/mac/drawingml/2011/main" val="1"/>
             </a:ext>
           </a:extLst>
         </p:spPr>
@@ -12840,7 +12840,7 @@
             </a:ln>
             <a:extLst>
               <a:ext uri="{C572A759-6A51-4108-AA02-DFA0A04FC94B}">
-                <ma14:wrappingTextBoxFlag xmlns:ma14="http://schemas.microsoft.com/office/mac/drawingml/2011/main" xmlns="" val="1"/>
+                <ma14:wrappingTextBoxFlag xmlns="" xmlns:ma14="http://schemas.microsoft.com/office/mac/drawingml/2011/main" val="1"/>
               </a:ext>
             </a:extLst>
           </p:spPr>
@@ -13004,7 +13004,7 @@
             </a:ln>
             <a:extLst>
               <a:ext uri="{C572A759-6A51-4108-AA02-DFA0A04FC94B}">
-                <ma14:wrappingTextBoxFlag xmlns:ma14="http://schemas.microsoft.com/office/mac/drawingml/2011/main" xmlns="" val="1"/>
+                <ma14:wrappingTextBoxFlag xmlns="" xmlns:ma14="http://schemas.microsoft.com/office/mac/drawingml/2011/main" val="1"/>
               </a:ext>
             </a:extLst>
           </p:spPr>
@@ -13055,7 +13055,7 @@
             </a:ln>
             <a:extLst>
               <a:ext uri="{C572A759-6A51-4108-AA02-DFA0A04FC94B}">
-                <ma14:wrappingTextBoxFlag xmlns:ma14="http://schemas.microsoft.com/office/mac/drawingml/2011/main" xmlns="" val="1"/>
+                <ma14:wrappingTextBoxFlag xmlns="" xmlns:ma14="http://schemas.microsoft.com/office/mac/drawingml/2011/main" val="1"/>
               </a:ext>
             </a:extLst>
           </p:spPr>
@@ -13227,7 +13227,7 @@
             </a:ln>
             <a:extLst>
               <a:ext uri="{C572A759-6A51-4108-AA02-DFA0A04FC94B}">
-                <ma14:wrappingTextBoxFlag xmlns:ma14="http://schemas.microsoft.com/office/mac/drawingml/2011/main" xmlns="" val="1"/>
+                <ma14:wrappingTextBoxFlag xmlns="" xmlns:ma14="http://schemas.microsoft.com/office/mac/drawingml/2011/main" val="1"/>
               </a:ext>
             </a:extLst>
           </p:spPr>
@@ -13352,7 +13352,7 @@
             </a:ln>
             <a:extLst>
               <a:ext uri="{C572A759-6A51-4108-AA02-DFA0A04FC94B}">
-                <ma14:wrappingTextBoxFlag xmlns:ma14="http://schemas.microsoft.com/office/mac/drawingml/2011/main" xmlns="" val="1"/>
+                <ma14:wrappingTextBoxFlag xmlns="" xmlns:ma14="http://schemas.microsoft.com/office/mac/drawingml/2011/main" val="1"/>
               </a:ext>
             </a:extLst>
           </p:spPr>
@@ -13400,7 +13400,7 @@
             </a:ln>
             <a:extLst>
               <a:ext uri="{C572A759-6A51-4108-AA02-DFA0A04FC94B}">
-                <ma14:wrappingTextBoxFlag xmlns:ma14="http://schemas.microsoft.com/office/mac/drawingml/2011/main" xmlns="" val="1"/>
+                <ma14:wrappingTextBoxFlag xmlns="" xmlns:ma14="http://schemas.microsoft.com/office/mac/drawingml/2011/main" val="1"/>
               </a:ext>
             </a:extLst>
           </p:spPr>
@@ -13448,7 +13448,7 @@
             </a:ln>
             <a:extLst>
               <a:ext uri="{C572A759-6A51-4108-AA02-DFA0A04FC94B}">
-                <ma14:wrappingTextBoxFlag xmlns:ma14="http://schemas.microsoft.com/office/mac/drawingml/2011/main" xmlns="" val="1"/>
+                <ma14:wrappingTextBoxFlag xmlns="" xmlns:ma14="http://schemas.microsoft.com/office/mac/drawingml/2011/main" val="1"/>
               </a:ext>
             </a:extLst>
           </p:spPr>
@@ -13496,7 +13496,7 @@
             </a:ln>
             <a:extLst>
               <a:ext uri="{C572A759-6A51-4108-AA02-DFA0A04FC94B}">
-                <ma14:wrappingTextBoxFlag xmlns:ma14="http://schemas.microsoft.com/office/mac/drawingml/2011/main" xmlns="" val="1"/>
+                <ma14:wrappingTextBoxFlag xmlns="" xmlns:ma14="http://schemas.microsoft.com/office/mac/drawingml/2011/main" val="1"/>
               </a:ext>
             </a:extLst>
           </p:spPr>
@@ -13544,7 +13544,7 @@
             </a:ln>
             <a:extLst>
               <a:ext uri="{C572A759-6A51-4108-AA02-DFA0A04FC94B}">
-                <ma14:wrappingTextBoxFlag xmlns:ma14="http://schemas.microsoft.com/office/mac/drawingml/2011/main" xmlns="" val="1"/>
+                <ma14:wrappingTextBoxFlag xmlns="" xmlns:ma14="http://schemas.microsoft.com/office/mac/drawingml/2011/main" val="1"/>
               </a:ext>
             </a:extLst>
           </p:spPr>
@@ -13592,7 +13592,7 @@
             </a:ln>
             <a:extLst>
               <a:ext uri="{C572A759-6A51-4108-AA02-DFA0A04FC94B}">
-                <ma14:wrappingTextBoxFlag xmlns:ma14="http://schemas.microsoft.com/office/mac/drawingml/2011/main" xmlns="" val="1"/>
+                <ma14:wrappingTextBoxFlag xmlns="" xmlns:ma14="http://schemas.microsoft.com/office/mac/drawingml/2011/main" val="1"/>
               </a:ext>
             </a:extLst>
           </p:spPr>
@@ -13644,7 +13644,7 @@
           </a:ln>
           <a:extLst>
             <a:ext uri="{C572A759-6A51-4108-AA02-DFA0A04FC94B}">
-              <ma14:wrappingTextBoxFlag xmlns:ma14="http://schemas.microsoft.com/office/mac/drawingml/2011/main" xmlns="" val="1"/>
+              <ma14:wrappingTextBoxFlag xmlns="" xmlns:ma14="http://schemas.microsoft.com/office/mac/drawingml/2011/main" val="1"/>
             </a:ext>
           </a:extLst>
         </p:spPr>
@@ -13765,7 +13765,7 @@
           </a:ln>
           <a:extLst>
             <a:ext uri="{C572A759-6A51-4108-AA02-DFA0A04FC94B}">
-              <ma14:wrappingTextBoxFlag xmlns:ma14="http://schemas.microsoft.com/office/mac/drawingml/2011/main" xmlns="" val="1"/>
+              <ma14:wrappingTextBoxFlag xmlns="" xmlns:ma14="http://schemas.microsoft.com/office/mac/drawingml/2011/main" val="1"/>
             </a:ext>
           </a:extLst>
         </p:spPr>
@@ -13884,7 +13884,7 @@
             </a:ln>
             <a:extLst>
               <a:ext uri="{C572A759-6A51-4108-AA02-DFA0A04FC94B}">
-                <ma14:wrappingTextBoxFlag xmlns:ma14="http://schemas.microsoft.com/office/mac/drawingml/2011/main" xmlns="" val="1"/>
+                <ma14:wrappingTextBoxFlag xmlns="" xmlns:ma14="http://schemas.microsoft.com/office/mac/drawingml/2011/main" val="1"/>
               </a:ext>
             </a:extLst>
           </p:spPr>
@@ -13971,7 +13971,7 @@
             </a:ln>
             <a:extLst>
               <a:ext uri="{C572A759-6A51-4108-AA02-DFA0A04FC94B}">
-                <ma14:wrappingTextBoxFlag xmlns:ma14="http://schemas.microsoft.com/office/mac/drawingml/2011/main" xmlns="" val="1"/>
+                <ma14:wrappingTextBoxFlag xmlns="" xmlns:ma14="http://schemas.microsoft.com/office/mac/drawingml/2011/main" val="1"/>
               </a:ext>
             </a:extLst>
           </p:spPr>
@@ -14018,7 +14018,7 @@
             </a:ln>
             <a:extLst>
               <a:ext uri="{C572A759-6A51-4108-AA02-DFA0A04FC94B}">
-                <ma14:wrappingTextBoxFlag xmlns:ma14="http://schemas.microsoft.com/office/mac/drawingml/2011/main" xmlns="" val="1"/>
+                <ma14:wrappingTextBoxFlag xmlns="" xmlns:ma14="http://schemas.microsoft.com/office/mac/drawingml/2011/main" val="1"/>
               </a:ext>
             </a:extLst>
           </p:spPr>
@@ -14170,7 +14170,7 @@
             </a:ln>
             <a:extLst>
               <a:ext uri="{C572A759-6A51-4108-AA02-DFA0A04FC94B}">
-                <ma14:wrappingTextBoxFlag xmlns:ma14="http://schemas.microsoft.com/office/mac/drawingml/2011/main" xmlns="" val="1"/>
+                <ma14:wrappingTextBoxFlag xmlns="" xmlns:ma14="http://schemas.microsoft.com/office/mac/drawingml/2011/main" val="1"/>
               </a:ext>
             </a:extLst>
           </p:spPr>

</xml_diff>